<commit_message>
Added Start and End tile
</commit_message>
<xml_diff>
--- a/Documents/Iteration1/Team 7-Iteration 1.pptx
+++ b/Documents/Iteration1/Team 7-Iteration 1.pptx
@@ -1990,7 +1990,7 @@
         </p:nvSpPr>
         <p:spPr>
           <a:xfrm>
-            <a:off x="381300" y="685800"/>
+            <a:off x="381000" y="685800"/>
             <a:ext cx="6096000" cy="3429000"/>
           </a:xfrm>
           <a:custGeom>
@@ -11292,17 +11292,7 @@
                 <a:latin typeface="Times New Roman" pitchFamily="18" charset="0"/>
                 <a:cs typeface="Times New Roman" pitchFamily="18" charset="0"/>
               </a:rPr>
-              <a:t>Game Input and </a:t>
-            </a:r>
-            <a:r>
-              <a:rPr lang="en-US" sz="3000" dirty="0" smtClean="0">
-                <a:solidFill>
-                  <a:srgbClr val="FFFFFF"/>
-                </a:solidFill>
-                <a:latin typeface="Times New Roman" pitchFamily="18" charset="0"/>
-                <a:cs typeface="Times New Roman" pitchFamily="18" charset="0"/>
-              </a:rPr>
-              <a:t>Output</a:t>
+              <a:t>Game Input and Output</a:t>
             </a:r>
             <a:endParaRPr lang="en-US" sz="3000" dirty="0"/>
           </a:p>
@@ -14720,30 +14710,26 @@
       </p:sp>
       <p:pic>
         <p:nvPicPr>
-          <p:cNvPr id="177" name="Google Shape;177;p20"/>
-          <p:cNvPicPr preferRelativeResize="0"/>
+          <p:cNvPr id="4" name="Picture 3" descr="GameSS.JPG"/>
+          <p:cNvPicPr>
+            <a:picLocks noChangeAspect="1"/>
+          </p:cNvPicPr>
           <p:nvPr/>
         </p:nvPicPr>
         <p:blipFill>
-          <a:blip r:embed="rId3">
-            <a:alphaModFix/>
-          </a:blip>
+          <a:blip r:embed="rId3"/>
           <a:stretch>
             <a:fillRect/>
           </a:stretch>
         </p:blipFill>
         <p:spPr>
           <a:xfrm>
-            <a:off x="1297500" y="1162100"/>
-            <a:ext cx="6807400" cy="3654625"/>
+            <a:off x="1447800" y="1123950"/>
+            <a:ext cx="6400800" cy="3586941"/>
           </a:xfrm>
           <a:prstGeom prst="rect">
             <a:avLst/>
           </a:prstGeom>
-          <a:noFill/>
-          <a:ln>
-            <a:noFill/>
-          </a:ln>
         </p:spPr>
       </p:pic>
     </p:spTree>

</xml_diff>